<commit_message>
Some finishing touches for AGU
Some finishing touches for AGU, including spectrograms for the three
dates and those images added to the 11/22 tagup
</commit_message>
<xml_diff>
--- a/Tagup_11(Nov)_22_2016.pptx
+++ b/Tagup_11(Nov)_22_2016.pptx
@@ -224,7 +224,7 @@
             <a:fld id="{CD401A79-7455-462E-980C-30C5D71DD360}" type="datetimeFigureOut">
               <a:rPr lang="en-US" smtClean="0"/>
               <a:pPr/>
-              <a:t>11/17/2016</a:t>
+              <a:t>12/13/2016</a:t>
             </a:fld>
             <a:endParaRPr lang="en-US"/>
           </a:p>
@@ -290,38 +290,37 @@
           <a:p>
             <a:pPr lvl="0"/>
             <a:r>
-              <a:rPr lang="en-US" smtClean="0"/>
+              <a:rPr lang="en-US"/>
               <a:t>Click to edit Master text styles</a:t>
             </a:r>
           </a:p>
           <a:p>
             <a:pPr lvl="1"/>
             <a:r>
-              <a:rPr lang="en-US" smtClean="0"/>
+              <a:rPr lang="en-US"/>
               <a:t>Second level</a:t>
             </a:r>
           </a:p>
           <a:p>
             <a:pPr lvl="2"/>
             <a:r>
-              <a:rPr lang="en-US" smtClean="0"/>
+              <a:rPr lang="en-US"/>
               <a:t>Third level</a:t>
             </a:r>
           </a:p>
           <a:p>
             <a:pPr lvl="3"/>
             <a:r>
-              <a:rPr lang="en-US" smtClean="0"/>
+              <a:rPr lang="en-US"/>
               <a:t>Fourth level</a:t>
             </a:r>
           </a:p>
           <a:p>
             <a:pPr lvl="4"/>
             <a:r>
-              <a:rPr lang="en-US" smtClean="0"/>
+              <a:rPr lang="en-US"/>
               <a:t>Fifth level</a:t>
             </a:r>
-            <a:endParaRPr lang="en-US"/>
           </a:p>
         </p:txBody>
       </p:sp>
@@ -533,10 +532,9 @@
           <a:lstStyle/>
           <a:p>
             <a:r>
-              <a:rPr lang="en-US" smtClean="0"/>
+              <a:rPr lang="en-US"/>
               <a:t>Click to edit Master title style</a:t>
             </a:r>
-            <a:endParaRPr lang="en-US"/>
           </a:p>
         </p:txBody>
       </p:sp>
@@ -652,10 +650,9 @@
           </a:lstStyle>
           <a:p>
             <a:r>
-              <a:rPr lang="en-US" smtClean="0"/>
+              <a:rPr lang="en-US"/>
               <a:t>Click to edit Master subtitle style</a:t>
             </a:r>
-            <a:endParaRPr lang="en-US"/>
           </a:p>
         </p:txBody>
       </p:sp>
@@ -677,7 +674,7 @@
             <a:fld id="{2222A738-AC66-4C35-A8E8-BFBFB4A252B4}" type="datetime1">
               <a:rPr lang="en-US" smtClean="0"/>
               <a:pPr/>
-              <a:t>11/17/2016</a:t>
+              <a:t>12/13/2016</a:t>
             </a:fld>
             <a:endParaRPr lang="en-US"/>
           </a:p>
@@ -767,10 +764,9 @@
           <a:lstStyle/>
           <a:p>
             <a:r>
-              <a:rPr lang="en-US" smtClean="0"/>
+              <a:rPr lang="en-US"/>
               <a:t>Click to edit Master title style</a:t>
             </a:r>
-            <a:endParaRPr lang="en-US"/>
           </a:p>
         </p:txBody>
       </p:sp>
@@ -791,38 +787,37 @@
           <a:p>
             <a:pPr lvl="0"/>
             <a:r>
-              <a:rPr lang="en-US" smtClean="0"/>
+              <a:rPr lang="en-US"/>
               <a:t>Click to edit Master text styles</a:t>
             </a:r>
           </a:p>
           <a:p>
             <a:pPr lvl="1"/>
             <a:r>
-              <a:rPr lang="en-US" smtClean="0"/>
+              <a:rPr lang="en-US"/>
               <a:t>Second level</a:t>
             </a:r>
           </a:p>
           <a:p>
             <a:pPr lvl="2"/>
             <a:r>
-              <a:rPr lang="en-US" smtClean="0"/>
+              <a:rPr lang="en-US"/>
               <a:t>Third level</a:t>
             </a:r>
           </a:p>
           <a:p>
             <a:pPr lvl="3"/>
             <a:r>
-              <a:rPr lang="en-US" smtClean="0"/>
+              <a:rPr lang="en-US"/>
               <a:t>Fourth level</a:t>
             </a:r>
           </a:p>
           <a:p>
             <a:pPr lvl="4"/>
             <a:r>
-              <a:rPr lang="en-US" smtClean="0"/>
+              <a:rPr lang="en-US"/>
               <a:t>Fifth level</a:t>
             </a:r>
-            <a:endParaRPr lang="en-US"/>
           </a:p>
         </p:txBody>
       </p:sp>
@@ -844,7 +839,7 @@
             <a:fld id="{F7652583-5848-4DB2-BC36-7C5F69EEED73}" type="datetime1">
               <a:rPr lang="en-US" smtClean="0"/>
               <a:pPr/>
-              <a:t>11/17/2016</a:t>
+              <a:t>12/13/2016</a:t>
             </a:fld>
             <a:endParaRPr lang="en-US"/>
           </a:p>
@@ -939,10 +934,9 @@
           <a:lstStyle/>
           <a:p>
             <a:r>
-              <a:rPr lang="en-US" smtClean="0"/>
+              <a:rPr lang="en-US"/>
               <a:t>Click to edit Master title style</a:t>
             </a:r>
-            <a:endParaRPr lang="en-US"/>
           </a:p>
         </p:txBody>
       </p:sp>
@@ -968,38 +962,37 @@
           <a:p>
             <a:pPr lvl="0"/>
             <a:r>
-              <a:rPr lang="en-US" smtClean="0"/>
+              <a:rPr lang="en-US"/>
               <a:t>Click to edit Master text styles</a:t>
             </a:r>
           </a:p>
           <a:p>
             <a:pPr lvl="1"/>
             <a:r>
-              <a:rPr lang="en-US" smtClean="0"/>
+              <a:rPr lang="en-US"/>
               <a:t>Second level</a:t>
             </a:r>
           </a:p>
           <a:p>
             <a:pPr lvl="2"/>
             <a:r>
-              <a:rPr lang="en-US" smtClean="0"/>
+              <a:rPr lang="en-US"/>
               <a:t>Third level</a:t>
             </a:r>
           </a:p>
           <a:p>
             <a:pPr lvl="3"/>
             <a:r>
-              <a:rPr lang="en-US" smtClean="0"/>
+              <a:rPr lang="en-US"/>
               <a:t>Fourth level</a:t>
             </a:r>
           </a:p>
           <a:p>
             <a:pPr lvl="4"/>
             <a:r>
-              <a:rPr lang="en-US" smtClean="0"/>
+              <a:rPr lang="en-US"/>
               <a:t>Fifth level</a:t>
             </a:r>
-            <a:endParaRPr lang="en-US"/>
           </a:p>
         </p:txBody>
       </p:sp>
@@ -1021,7 +1014,7 @@
             <a:fld id="{C3113D9D-C463-4CD1-99A9-1E57222C0E68}" type="datetime1">
               <a:rPr lang="en-US" smtClean="0"/>
               <a:pPr/>
-              <a:t>11/17/2016</a:t>
+              <a:t>12/13/2016</a:t>
             </a:fld>
             <a:endParaRPr lang="en-US"/>
           </a:p>
@@ -1111,10 +1104,9 @@
           <a:lstStyle/>
           <a:p>
             <a:r>
-              <a:rPr lang="en-US" smtClean="0"/>
+              <a:rPr lang="en-US"/>
               <a:t>Click to edit Master title style</a:t>
             </a:r>
-            <a:endParaRPr lang="en-US"/>
           </a:p>
         </p:txBody>
       </p:sp>
@@ -1135,38 +1127,37 @@
           <a:p>
             <a:pPr lvl="0"/>
             <a:r>
-              <a:rPr lang="en-US" smtClean="0"/>
+              <a:rPr lang="en-US"/>
               <a:t>Click to edit Master text styles</a:t>
             </a:r>
           </a:p>
           <a:p>
             <a:pPr lvl="1"/>
             <a:r>
-              <a:rPr lang="en-US" smtClean="0"/>
+              <a:rPr lang="en-US"/>
               <a:t>Second level</a:t>
             </a:r>
           </a:p>
           <a:p>
             <a:pPr lvl="2"/>
             <a:r>
-              <a:rPr lang="en-US" smtClean="0"/>
+              <a:rPr lang="en-US"/>
               <a:t>Third level</a:t>
             </a:r>
           </a:p>
           <a:p>
             <a:pPr lvl="3"/>
             <a:r>
-              <a:rPr lang="en-US" smtClean="0"/>
+              <a:rPr lang="en-US"/>
               <a:t>Fourth level</a:t>
             </a:r>
           </a:p>
           <a:p>
             <a:pPr lvl="4"/>
             <a:r>
-              <a:rPr lang="en-US" smtClean="0"/>
+              <a:rPr lang="en-US"/>
               <a:t>Fifth level</a:t>
             </a:r>
-            <a:endParaRPr lang="en-US"/>
           </a:p>
         </p:txBody>
       </p:sp>
@@ -1188,7 +1179,7 @@
             <a:fld id="{F124DDF6-22C2-494F-93E2-345F2B432991}" type="datetime1">
               <a:rPr lang="en-US" smtClean="0"/>
               <a:pPr/>
-              <a:t>11/17/2016</a:t>
+              <a:t>12/13/2016</a:t>
             </a:fld>
             <a:endParaRPr lang="en-US"/>
           </a:p>
@@ -1287,10 +1278,9 @@
           </a:lstStyle>
           <a:p>
             <a:r>
-              <a:rPr lang="en-US" smtClean="0"/>
+              <a:rPr lang="en-US"/>
               <a:t>Click to edit Master title style</a:t>
             </a:r>
-            <a:endParaRPr lang="en-US"/>
           </a:p>
         </p:txBody>
       </p:sp>
@@ -1407,7 +1397,7 @@
           <a:p>
             <a:pPr lvl="0"/>
             <a:r>
-              <a:rPr lang="en-US" smtClean="0"/>
+              <a:rPr lang="en-US"/>
               <a:t>Click to edit Master text styles</a:t>
             </a:r>
           </a:p>
@@ -1431,7 +1421,7 @@
             <a:fld id="{F183521D-CD68-44CE-A2A1-7AB819BCEB09}" type="datetime1">
               <a:rPr lang="en-US" smtClean="0"/>
               <a:pPr/>
-              <a:t>11/17/2016</a:t>
+              <a:t>12/13/2016</a:t>
             </a:fld>
             <a:endParaRPr lang="en-US"/>
           </a:p>
@@ -1521,10 +1511,9 @@
           <a:lstStyle/>
           <a:p>
             <a:r>
-              <a:rPr lang="en-US" smtClean="0"/>
+              <a:rPr lang="en-US"/>
               <a:t>Click to edit Master title style</a:t>
             </a:r>
-            <a:endParaRPr lang="en-US"/>
           </a:p>
         </p:txBody>
       </p:sp>
@@ -1578,38 +1567,37 @@
           <a:p>
             <a:pPr lvl="0"/>
             <a:r>
-              <a:rPr lang="en-US" smtClean="0"/>
+              <a:rPr lang="en-US"/>
               <a:t>Click to edit Master text styles</a:t>
             </a:r>
           </a:p>
           <a:p>
             <a:pPr lvl="1"/>
             <a:r>
-              <a:rPr lang="en-US" smtClean="0"/>
+              <a:rPr lang="en-US"/>
               <a:t>Second level</a:t>
             </a:r>
           </a:p>
           <a:p>
             <a:pPr lvl="2"/>
             <a:r>
-              <a:rPr lang="en-US" smtClean="0"/>
+              <a:rPr lang="en-US"/>
               <a:t>Third level</a:t>
             </a:r>
           </a:p>
           <a:p>
             <a:pPr lvl="3"/>
             <a:r>
-              <a:rPr lang="en-US" smtClean="0"/>
+              <a:rPr lang="en-US"/>
               <a:t>Fourth level</a:t>
             </a:r>
           </a:p>
           <a:p>
             <a:pPr lvl="4"/>
             <a:r>
-              <a:rPr lang="en-US" smtClean="0"/>
+              <a:rPr lang="en-US"/>
               <a:t>Fifth level</a:t>
             </a:r>
-            <a:endParaRPr lang="en-US"/>
           </a:p>
         </p:txBody>
       </p:sp>
@@ -1663,38 +1651,37 @@
           <a:p>
             <a:pPr lvl="0"/>
             <a:r>
-              <a:rPr lang="en-US" smtClean="0"/>
+              <a:rPr lang="en-US"/>
               <a:t>Click to edit Master text styles</a:t>
             </a:r>
           </a:p>
           <a:p>
             <a:pPr lvl="1"/>
             <a:r>
-              <a:rPr lang="en-US" smtClean="0"/>
+              <a:rPr lang="en-US"/>
               <a:t>Second level</a:t>
             </a:r>
           </a:p>
           <a:p>
             <a:pPr lvl="2"/>
             <a:r>
-              <a:rPr lang="en-US" smtClean="0"/>
+              <a:rPr lang="en-US"/>
               <a:t>Third level</a:t>
             </a:r>
           </a:p>
           <a:p>
             <a:pPr lvl="3"/>
             <a:r>
-              <a:rPr lang="en-US" smtClean="0"/>
+              <a:rPr lang="en-US"/>
               <a:t>Fourth level</a:t>
             </a:r>
           </a:p>
           <a:p>
             <a:pPr lvl="4"/>
             <a:r>
-              <a:rPr lang="en-US" smtClean="0"/>
+              <a:rPr lang="en-US"/>
               <a:t>Fifth level</a:t>
             </a:r>
-            <a:endParaRPr lang="en-US"/>
           </a:p>
         </p:txBody>
       </p:sp>
@@ -1716,7 +1703,7 @@
             <a:fld id="{AAA6A8F3-08B9-4C96-84FE-AA848E350DEE}" type="datetime1">
               <a:rPr lang="en-US" smtClean="0"/>
               <a:pPr/>
-              <a:t>11/17/2016</a:t>
+              <a:t>12/13/2016</a:t>
             </a:fld>
             <a:endParaRPr lang="en-US"/>
           </a:p>
@@ -1810,10 +1797,9 @@
           </a:lstStyle>
           <a:p>
             <a:r>
-              <a:rPr lang="en-US" smtClean="0"/>
+              <a:rPr lang="en-US"/>
               <a:t>Click to edit Master title style</a:t>
             </a:r>
-            <a:endParaRPr lang="en-US"/>
           </a:p>
         </p:txBody>
       </p:sp>
@@ -1876,7 +1862,7 @@
           <a:p>
             <a:pPr lvl="0"/>
             <a:r>
-              <a:rPr lang="en-US" smtClean="0"/>
+              <a:rPr lang="en-US"/>
               <a:t>Click to edit Master text styles</a:t>
             </a:r>
           </a:p>
@@ -1932,38 +1918,37 @@
           <a:p>
             <a:pPr lvl="0"/>
             <a:r>
-              <a:rPr lang="en-US" smtClean="0"/>
+              <a:rPr lang="en-US"/>
               <a:t>Click to edit Master text styles</a:t>
             </a:r>
           </a:p>
           <a:p>
             <a:pPr lvl="1"/>
             <a:r>
-              <a:rPr lang="en-US" smtClean="0"/>
+              <a:rPr lang="en-US"/>
               <a:t>Second level</a:t>
             </a:r>
           </a:p>
           <a:p>
             <a:pPr lvl="2"/>
             <a:r>
-              <a:rPr lang="en-US" smtClean="0"/>
+              <a:rPr lang="en-US"/>
               <a:t>Third level</a:t>
             </a:r>
           </a:p>
           <a:p>
             <a:pPr lvl="3"/>
             <a:r>
-              <a:rPr lang="en-US" smtClean="0"/>
+              <a:rPr lang="en-US"/>
               <a:t>Fourth level</a:t>
             </a:r>
           </a:p>
           <a:p>
             <a:pPr lvl="4"/>
             <a:r>
-              <a:rPr lang="en-US" smtClean="0"/>
+              <a:rPr lang="en-US"/>
               <a:t>Fifth level</a:t>
             </a:r>
-            <a:endParaRPr lang="en-US"/>
           </a:p>
         </p:txBody>
       </p:sp>
@@ -2026,7 +2011,7 @@
           <a:p>
             <a:pPr lvl="0"/>
             <a:r>
-              <a:rPr lang="en-US" smtClean="0"/>
+              <a:rPr lang="en-US"/>
               <a:t>Click to edit Master text styles</a:t>
             </a:r>
           </a:p>
@@ -2082,38 +2067,37 @@
           <a:p>
             <a:pPr lvl="0"/>
             <a:r>
-              <a:rPr lang="en-US" smtClean="0"/>
+              <a:rPr lang="en-US"/>
               <a:t>Click to edit Master text styles</a:t>
             </a:r>
           </a:p>
           <a:p>
             <a:pPr lvl="1"/>
             <a:r>
-              <a:rPr lang="en-US" smtClean="0"/>
+              <a:rPr lang="en-US"/>
               <a:t>Second level</a:t>
             </a:r>
           </a:p>
           <a:p>
             <a:pPr lvl="2"/>
             <a:r>
-              <a:rPr lang="en-US" smtClean="0"/>
+              <a:rPr lang="en-US"/>
               <a:t>Third level</a:t>
             </a:r>
           </a:p>
           <a:p>
             <a:pPr lvl="3"/>
             <a:r>
-              <a:rPr lang="en-US" smtClean="0"/>
+              <a:rPr lang="en-US"/>
               <a:t>Fourth level</a:t>
             </a:r>
           </a:p>
           <a:p>
             <a:pPr lvl="4"/>
             <a:r>
-              <a:rPr lang="en-US" smtClean="0"/>
+              <a:rPr lang="en-US"/>
               <a:t>Fifth level</a:t>
             </a:r>
-            <a:endParaRPr lang="en-US"/>
           </a:p>
         </p:txBody>
       </p:sp>
@@ -2135,7 +2119,7 @@
             <a:fld id="{1F9484A7-8E40-4A10-BE0E-872D46DF4BAA}" type="datetime1">
               <a:rPr lang="en-US" smtClean="0"/>
               <a:pPr/>
-              <a:t>11/17/2016</a:t>
+              <a:t>12/13/2016</a:t>
             </a:fld>
             <a:endParaRPr lang="en-US"/>
           </a:p>
@@ -2225,10 +2209,9 @@
           <a:lstStyle/>
           <a:p>
             <a:r>
-              <a:rPr lang="en-US" smtClean="0"/>
+              <a:rPr lang="en-US"/>
               <a:t>Click to edit Master title style</a:t>
             </a:r>
-            <a:endParaRPr lang="en-US"/>
           </a:p>
         </p:txBody>
       </p:sp>
@@ -2250,7 +2233,7 @@
             <a:fld id="{712D88B4-74D0-4395-B423-4AAFC9AAFA1B}" type="datetime1">
               <a:rPr lang="en-US" smtClean="0"/>
               <a:pPr/>
-              <a:t>11/17/2016</a:t>
+              <a:t>12/13/2016</a:t>
             </a:fld>
             <a:endParaRPr lang="en-US"/>
           </a:p>
@@ -2342,7 +2325,7 @@
             <a:fld id="{C59F7598-3C81-4A81-9842-45A4B08E4BA7}" type="datetime1">
               <a:rPr lang="en-US" smtClean="0"/>
               <a:pPr/>
-              <a:t>11/17/2016</a:t>
+              <a:t>12/13/2016</a:t>
             </a:fld>
             <a:endParaRPr lang="en-US"/>
           </a:p>
@@ -2441,10 +2424,9 @@
           </a:lstStyle>
           <a:p>
             <a:r>
-              <a:rPr lang="en-US" smtClean="0"/>
+              <a:rPr lang="en-US"/>
               <a:t>Click to edit Master title style</a:t>
             </a:r>
-            <a:endParaRPr lang="en-US"/>
           </a:p>
         </p:txBody>
       </p:sp>
@@ -2498,38 +2480,37 @@
           <a:p>
             <a:pPr lvl="0"/>
             <a:r>
-              <a:rPr lang="en-US" smtClean="0"/>
+              <a:rPr lang="en-US"/>
               <a:t>Click to edit Master text styles</a:t>
             </a:r>
           </a:p>
           <a:p>
             <a:pPr lvl="1"/>
             <a:r>
-              <a:rPr lang="en-US" smtClean="0"/>
+              <a:rPr lang="en-US"/>
               <a:t>Second level</a:t>
             </a:r>
           </a:p>
           <a:p>
             <a:pPr lvl="2"/>
             <a:r>
-              <a:rPr lang="en-US" smtClean="0"/>
+              <a:rPr lang="en-US"/>
               <a:t>Third level</a:t>
             </a:r>
           </a:p>
           <a:p>
             <a:pPr lvl="3"/>
             <a:r>
-              <a:rPr lang="en-US" smtClean="0"/>
+              <a:rPr lang="en-US"/>
               <a:t>Fourth level</a:t>
             </a:r>
           </a:p>
           <a:p>
             <a:pPr lvl="4"/>
             <a:r>
-              <a:rPr lang="en-US" smtClean="0"/>
+              <a:rPr lang="en-US"/>
               <a:t>Fifth level</a:t>
             </a:r>
-            <a:endParaRPr lang="en-US"/>
           </a:p>
         </p:txBody>
       </p:sp>
@@ -2592,7 +2573,7 @@
           <a:p>
             <a:pPr lvl="0"/>
             <a:r>
-              <a:rPr lang="en-US" smtClean="0"/>
+              <a:rPr lang="en-US"/>
               <a:t>Click to edit Master text styles</a:t>
             </a:r>
           </a:p>
@@ -2616,7 +2597,7 @@
             <a:fld id="{2EF746F4-5115-448D-A561-1245B68E7A3E}" type="datetime1">
               <a:rPr lang="en-US" smtClean="0"/>
               <a:pPr/>
-              <a:t>11/17/2016</a:t>
+              <a:t>12/13/2016</a:t>
             </a:fld>
             <a:endParaRPr lang="en-US"/>
           </a:p>
@@ -2715,10 +2696,9 @@
           </a:lstStyle>
           <a:p>
             <a:r>
-              <a:rPr lang="en-US" smtClean="0"/>
+              <a:rPr lang="en-US"/>
               <a:t>Click to edit Master title style</a:t>
             </a:r>
-            <a:endParaRPr lang="en-US"/>
           </a:p>
         </p:txBody>
       </p:sp>
@@ -2842,7 +2822,7 @@
           <a:p>
             <a:pPr lvl="0"/>
             <a:r>
-              <a:rPr lang="en-US" smtClean="0"/>
+              <a:rPr lang="en-US"/>
               <a:t>Click to edit Master text styles</a:t>
             </a:r>
           </a:p>
@@ -2866,7 +2846,7 @@
             <a:fld id="{A45542D2-6766-447E-8CFC-810A9475DFBA}" type="datetime1">
               <a:rPr lang="en-US" smtClean="0"/>
               <a:pPr/>
-              <a:t>11/17/2016</a:t>
+              <a:t>12/13/2016</a:t>
             </a:fld>
             <a:endParaRPr lang="en-US"/>
           </a:p>
@@ -2971,10 +2951,9 @@
           <a:lstStyle/>
           <a:p>
             <a:r>
-              <a:rPr lang="en-US" smtClean="0"/>
+              <a:rPr lang="en-US"/>
               <a:t>Click to edit Master title style</a:t>
             </a:r>
-            <a:endParaRPr lang="en-US"/>
           </a:p>
         </p:txBody>
       </p:sp>
@@ -3005,38 +2984,37 @@
           <a:p>
             <a:pPr lvl="0"/>
             <a:r>
-              <a:rPr lang="en-US" smtClean="0"/>
+              <a:rPr lang="en-US"/>
               <a:t>Click to edit Master text styles</a:t>
             </a:r>
           </a:p>
           <a:p>
             <a:pPr lvl="1"/>
             <a:r>
-              <a:rPr lang="en-US" smtClean="0"/>
+              <a:rPr lang="en-US"/>
               <a:t>Second level</a:t>
             </a:r>
           </a:p>
           <a:p>
             <a:pPr lvl="2"/>
             <a:r>
-              <a:rPr lang="en-US" smtClean="0"/>
+              <a:rPr lang="en-US"/>
               <a:t>Third level</a:t>
             </a:r>
           </a:p>
           <a:p>
             <a:pPr lvl="3"/>
             <a:r>
-              <a:rPr lang="en-US" smtClean="0"/>
+              <a:rPr lang="en-US"/>
               <a:t>Fourth level</a:t>
             </a:r>
           </a:p>
           <a:p>
             <a:pPr lvl="4"/>
             <a:r>
-              <a:rPr lang="en-US" smtClean="0"/>
+              <a:rPr lang="en-US"/>
               <a:t>Fifth level</a:t>
             </a:r>
-            <a:endParaRPr lang="en-US"/>
           </a:p>
         </p:txBody>
       </p:sp>
@@ -3076,7 +3054,7 @@
             <a:fld id="{DB25A288-8A58-4F5D-B4A1-85D4D24FA325}" type="datetime1">
               <a:rPr lang="en-US" smtClean="0"/>
               <a:pPr/>
-              <a:t>11/17/2016</a:t>
+              <a:t>12/13/2016</a:t>
             </a:fld>
             <a:endParaRPr lang="en-US"/>
           </a:p>
@@ -3464,22 +3442,17 @@
           <a:lstStyle/>
           <a:p>
             <a:r>
-              <a:rPr lang="en-US" dirty="0" smtClean="0"/>
-              <a:t>Nov </a:t>
-            </a:r>
-            <a:r>
-              <a:rPr lang="en-US" dirty="0" smtClean="0"/>
-              <a:t>22 </a:t>
-            </a:r>
-            <a:r>
-              <a:rPr lang="en-US" dirty="0" err="1" smtClean="0"/>
+              <a:rPr lang="en-US" dirty="0"/>
+              <a:t>Nov 22 </a:t>
+            </a:r>
+            <a:r>
+              <a:rPr lang="en-US" dirty="0" err="1"/>
               <a:t>Tagup</a:t>
             </a:r>
             <a:r>
-              <a:rPr lang="en-US" dirty="0" smtClean="0"/>
+              <a:rPr lang="en-US" dirty="0"/>
               <a:t> </a:t>
             </a:r>
-            <a:endParaRPr lang="en-US" dirty="0"/>
           </a:p>
         </p:txBody>
       </p:sp>
@@ -3531,13 +3504,6 @@
   <p:clrMapOvr>
     <a:masterClrMapping/>
   </p:clrMapOvr>
-  <p:timing>
-    <p:tnLst>
-      <p:par>
-        <p:cTn id="1" dur="indefinite" restart="never" nodeType="tmRoot"/>
-      </p:par>
-    </p:tnLst>
-  </p:timing>
 </p:sld>
 </file>
 
@@ -3581,10 +3547,9 @@
           <a:lstStyle/>
           <a:p>
             <a:r>
-              <a:rPr lang="en-US" dirty="0" smtClean="0"/>
+              <a:rPr lang="en-US" dirty="0"/>
               <a:t>Context</a:t>
             </a:r>
-            <a:endParaRPr lang="en-US" dirty="0"/>
           </a:p>
         </p:txBody>
       </p:sp>
@@ -3717,13 +3682,6 @@
   <p:clrMapOvr>
     <a:masterClrMapping/>
   </p:clrMapOvr>
-  <p:timing>
-    <p:tnLst>
-      <p:par>
-        <p:cTn id="1" dur="indefinite" restart="never" nodeType="tmRoot"/>
-      </p:par>
-    </p:tnLst>
-  </p:timing>
 </p:sld>
 </file>
 
@@ -3767,10 +3725,9 @@
           <a:lstStyle/>
           <a:p>
             <a:r>
-              <a:rPr lang="en-US" dirty="0" smtClean="0"/>
+              <a:rPr lang="en-US" dirty="0"/>
               <a:t>Pitch Angle Distributions</a:t>
             </a:r>
-            <a:endParaRPr lang="en-US" dirty="0"/>
           </a:p>
         </p:txBody>
       </p:sp>
@@ -3943,18 +3900,41 @@
           </a:prstGeom>
         </p:spPr>
       </p:pic>
+      <p:pic>
+        <p:nvPicPr>
+          <p:cNvPr id="9" name="Picture 8"/>
+          <p:cNvPicPr>
+            <a:picLocks noChangeAspect="1"/>
+          </p:cNvPicPr>
+          <p:nvPr/>
+        </p:nvPicPr>
+        <p:blipFill>
+          <a:blip r:embed="rId7" cstate="print">
+            <a:extLst>
+              <a:ext uri="{28A0092B-C50C-407E-A947-70E740481C1C}">
+                <a14:useLocalDpi xmlns:a14="http://schemas.microsoft.com/office/drawing/2010/main" val="0"/>
+              </a:ext>
+            </a:extLst>
+          </a:blip>
+          <a:stretch>
+            <a:fillRect/>
+          </a:stretch>
+        </p:blipFill>
+        <p:spPr>
+          <a:xfrm>
+            <a:off x="-3413839" y="1169963"/>
+            <a:ext cx="3395082" cy="3819467"/>
+          </a:xfrm>
+          <a:prstGeom prst="rect">
+            <a:avLst/>
+          </a:prstGeom>
+        </p:spPr>
+      </p:pic>
     </p:spTree>
   </p:cSld>
   <p:clrMapOvr>
     <a:masterClrMapping/>
   </p:clrMapOvr>
-  <p:timing>
-    <p:tnLst>
-      <p:par>
-        <p:cTn id="1" dur="indefinite" restart="never" nodeType="tmRoot"/>
-      </p:par>
-    </p:tnLst>
-  </p:timing>
 </p:sld>
 </file>
 
@@ -3975,8 +3955,8 @@
           <a:chExt cx="0" cy="0"/>
         </a:xfrm>
       </p:grpSpPr>
-      <mc:AlternateContent xmlns:mc="http://schemas.openxmlformats.org/markup-compatibility/2006">
-        <mc:Choice xmlns:a14="http://schemas.microsoft.com/office/drawing/2010/main" Requires="a14">
+      <mc:AlternateContent xmlns:mc="http://schemas.openxmlformats.org/markup-compatibility/2006" xmlns:a14="http://schemas.microsoft.com/office/drawing/2010/main">
+        <mc:Choice Requires="a14">
           <p:sp>
             <p:nvSpPr>
               <p:cNvPr id="8" name="TextBox 7"/>
@@ -4000,7 +3980,7 @@
               <a:lstStyle/>
               <a:p>
                 <a:r>
-                  <a:rPr lang="en-US" dirty="0" smtClean="0"/>
+                  <a:rPr lang="en-US" dirty="0"/>
                   <a:t>Northward Magnetic Field means </a:t>
                 </a:r>
                 <a14:m>
@@ -4026,7 +4006,7 @@
                   </m:oMath>
                 </a14:m>
                 <a:r>
-                  <a:rPr lang="en-US" dirty="0" smtClean="0"/>
+                  <a:rPr lang="en-US" dirty="0"/>
                   <a:t> comes from southern hemisphere (Northward flux) and </a:t>
                 </a:r>
                 <a14:m>
@@ -4052,15 +4032,14 @@
                   </m:oMath>
                 </a14:m>
                 <a:r>
-                  <a:rPr lang="en-US" dirty="0" smtClean="0"/>
+                  <a:rPr lang="en-US" dirty="0"/>
                   <a:t> comes from northern hemisphere (Southward flux)</a:t>
                 </a:r>
-                <a:endParaRPr lang="en-US" dirty="0"/>
               </a:p>
             </p:txBody>
           </p:sp>
         </mc:Choice>
-        <mc:Fallback>
+        <mc:Fallback xmlns="">
           <p:sp>
             <p:nvSpPr>
               <p:cNvPr id="8" name="TextBox 7"/>
@@ -4230,10 +4209,9 @@
           <a:lstStyle/>
           <a:p>
             <a:r>
-              <a:rPr lang="en-US" dirty="0" smtClean="0"/>
+              <a:rPr lang="en-US" dirty="0"/>
               <a:t>Mar 02 - 2016</a:t>
             </a:r>
-            <a:endParaRPr lang="en-US" dirty="0"/>
           </a:p>
         </p:txBody>
       </p:sp>
@@ -4285,13 +4263,6 @@
   <p:clrMapOvr>
     <a:masterClrMapping/>
   </p:clrMapOvr>
-  <p:timing>
-    <p:tnLst>
-      <p:par>
-        <p:cTn id="1" dur="indefinite" restart="never" nodeType="tmRoot"/>
-      </p:par>
-    </p:tnLst>
-  </p:timing>
 </p:sld>
 </file>
 
@@ -4335,10 +4306,9 @@
           <a:lstStyle/>
           <a:p>
             <a:r>
-              <a:rPr lang="en-US" dirty="0" smtClean="0"/>
+              <a:rPr lang="en-US" dirty="0"/>
               <a:t>Context</a:t>
             </a:r>
-            <a:endParaRPr lang="en-US" dirty="0"/>
           </a:p>
         </p:txBody>
       </p:sp>
@@ -4471,13 +4441,6 @@
   <p:clrMapOvr>
     <a:masterClrMapping/>
   </p:clrMapOvr>
-  <p:timing>
-    <p:tnLst>
-      <p:par>
-        <p:cTn id="1" dur="indefinite" restart="never" nodeType="tmRoot"/>
-      </p:par>
-    </p:tnLst>
-  </p:timing>
 </p:sld>
 </file>
 
@@ -4521,10 +4484,9 @@
           <a:lstStyle/>
           <a:p>
             <a:r>
-              <a:rPr lang="en-US" dirty="0" smtClean="0"/>
+              <a:rPr lang="en-US" dirty="0"/>
               <a:t>Pitch Angle Distributions</a:t>
             </a:r>
-            <a:endParaRPr lang="en-US" dirty="0"/>
           </a:p>
         </p:txBody>
       </p:sp>
@@ -4667,18 +4629,41 @@
           </a:prstGeom>
         </p:spPr>
       </p:pic>
+      <p:pic>
+        <p:nvPicPr>
+          <p:cNvPr id="3" name="Picture 2"/>
+          <p:cNvPicPr>
+            <a:picLocks noChangeAspect="1"/>
+          </p:cNvPicPr>
+          <p:nvPr/>
+        </p:nvPicPr>
+        <p:blipFill>
+          <a:blip r:embed="rId6" cstate="print">
+            <a:extLst>
+              <a:ext uri="{28A0092B-C50C-407E-A947-70E740481C1C}">
+                <a14:useLocalDpi xmlns:a14="http://schemas.microsoft.com/office/drawing/2010/main" val="0"/>
+              </a:ext>
+            </a:extLst>
+          </a:blip>
+          <a:stretch>
+            <a:fillRect/>
+          </a:stretch>
+        </p:blipFill>
+        <p:spPr>
+          <a:xfrm>
+            <a:off x="-3061434" y="1165469"/>
+            <a:ext cx="3061434" cy="3444113"/>
+          </a:xfrm>
+          <a:prstGeom prst="rect">
+            <a:avLst/>
+          </a:prstGeom>
+        </p:spPr>
+      </p:pic>
     </p:spTree>
   </p:cSld>
   <p:clrMapOvr>
     <a:masterClrMapping/>
   </p:clrMapOvr>
-  <p:timing>
-    <p:tnLst>
-      <p:par>
-        <p:cTn id="1" dur="indefinite" restart="never" nodeType="tmRoot"/>
-      </p:par>
-    </p:tnLst>
-  </p:timing>
 </p:sld>
 </file>
 
@@ -4699,8 +4684,8 @@
           <a:chExt cx="0" cy="0"/>
         </a:xfrm>
       </p:grpSpPr>
-      <mc:AlternateContent xmlns:mc="http://schemas.openxmlformats.org/markup-compatibility/2006">
-        <mc:Choice xmlns:a14="http://schemas.microsoft.com/office/drawing/2010/main" Requires="a14">
+      <mc:AlternateContent xmlns:mc="http://schemas.openxmlformats.org/markup-compatibility/2006" xmlns:a14="http://schemas.microsoft.com/office/drawing/2010/main">
+        <mc:Choice Requires="a14">
           <p:sp>
             <p:nvSpPr>
               <p:cNvPr id="8" name="TextBox 7"/>
@@ -4724,7 +4709,7 @@
               <a:lstStyle/>
               <a:p>
                 <a:r>
-                  <a:rPr lang="en-US" dirty="0" smtClean="0"/>
+                  <a:rPr lang="en-US" dirty="0"/>
                   <a:t>Northward Magnetic Field means </a:t>
                 </a:r>
                 <a14:m>
@@ -4750,7 +4735,7 @@
                   </m:oMath>
                 </a14:m>
                 <a:r>
-                  <a:rPr lang="en-US" dirty="0" smtClean="0"/>
+                  <a:rPr lang="en-US" dirty="0"/>
                   <a:t> comes from southern hemisphere (Northward flux) and </a:t>
                 </a:r>
                 <a14:m>
@@ -4776,15 +4761,14 @@
                   </m:oMath>
                 </a14:m>
                 <a:r>
-                  <a:rPr lang="en-US" dirty="0" smtClean="0"/>
+                  <a:rPr lang="en-US" dirty="0"/>
                   <a:t> comes from northern hemisphere (Southward flux)</a:t>
                 </a:r>
-                <a:endParaRPr lang="en-US" dirty="0"/>
               </a:p>
             </p:txBody>
           </p:sp>
         </mc:Choice>
-        <mc:Fallback>
+        <mc:Fallback xmlns="">
           <p:sp>
             <p:nvSpPr>
               <p:cNvPr id="8" name="TextBox 7"/>
@@ -4954,10 +4938,9 @@
           <a:lstStyle/>
           <a:p>
             <a:r>
-              <a:rPr lang="en-US" dirty="0" smtClean="0"/>
+              <a:rPr lang="en-US" dirty="0"/>
               <a:t>Poster Outline</a:t>
             </a:r>
-            <a:endParaRPr lang="en-US" dirty="0"/>
           </a:p>
         </p:txBody>
       </p:sp>
@@ -5057,10 +5040,9 @@
           <a:lstStyle/>
           <a:p>
             <a:r>
-              <a:rPr lang="en-US" dirty="0" smtClean="0"/>
+              <a:rPr lang="en-US" dirty="0"/>
               <a:t>Poster Outline</a:t>
             </a:r>
-            <a:endParaRPr lang="en-US" dirty="0"/>
           </a:p>
         </p:txBody>
       </p:sp>
@@ -5087,7 +5069,7 @@
           <a:lstStyle/>
           <a:p>
             <a:r>
-              <a:rPr lang="en-US" dirty="0" smtClean="0">
+              <a:rPr lang="en-US" dirty="0">
                 <a:solidFill>
                   <a:schemeClr val="accent6">
                     <a:lumMod val="75000"/>
@@ -5100,39 +5082,39 @@
           <a:p>
             <a:pPr lvl="1"/>
             <a:r>
-              <a:rPr lang="en-US" dirty="0" smtClean="0"/>
+              <a:rPr lang="en-US" dirty="0"/>
               <a:t>Mechanisms of </a:t>
             </a:r>
             <a:r>
-              <a:rPr lang="en-US" dirty="0" err="1" smtClean="0"/>
+              <a:rPr lang="en-US" dirty="0" err="1"/>
               <a:t>ionospheric</a:t>
             </a:r>
             <a:r>
-              <a:rPr lang="en-US" dirty="0" smtClean="0"/>
+              <a:rPr lang="en-US" dirty="0"/>
               <a:t> escape (Strangeway diagram)</a:t>
             </a:r>
           </a:p>
           <a:p>
             <a:pPr lvl="1"/>
             <a:r>
-              <a:rPr lang="en-US" dirty="0" smtClean="0"/>
+              <a:rPr lang="en-US" dirty="0"/>
               <a:t>Precipitating Electrons as a mechanism</a:t>
             </a:r>
           </a:p>
           <a:p>
             <a:pPr lvl="1"/>
             <a:r>
-              <a:rPr lang="en-US" dirty="0" err="1" smtClean="0"/>
+              <a:rPr lang="en-US" dirty="0" err="1"/>
               <a:t>Ambipolar</a:t>
             </a:r>
             <a:r>
-              <a:rPr lang="en-US" dirty="0" smtClean="0"/>
+              <a:rPr lang="en-US" dirty="0"/>
               <a:t> potential</a:t>
             </a:r>
           </a:p>
           <a:p>
             <a:r>
-              <a:rPr lang="en-US" dirty="0" smtClean="0">
+              <a:rPr lang="en-US" dirty="0">
                 <a:solidFill>
                   <a:srgbClr val="7030A0"/>
                 </a:solidFill>
@@ -5143,56 +5125,56 @@
           <a:p>
             <a:pPr lvl="1"/>
             <a:r>
-              <a:rPr lang="en-US" dirty="0" smtClean="0"/>
+              <a:rPr lang="en-US" dirty="0"/>
               <a:t>FPI Sky Map (time, </a:t>
             </a:r>
             <a:r>
-              <a:rPr lang="en-US" dirty="0" err="1" smtClean="0"/>
+              <a:rPr lang="en-US" dirty="0" err="1"/>
               <a:t>az</a:t>
             </a:r>
             <a:r>
-              <a:rPr lang="en-US" dirty="0" smtClean="0"/>
+              <a:rPr lang="en-US" dirty="0"/>
               <a:t>, el, energy – diagram)</a:t>
             </a:r>
           </a:p>
           <a:p>
             <a:pPr lvl="1"/>
             <a:r>
-              <a:rPr lang="en-US" dirty="0" smtClean="0"/>
+              <a:rPr lang="en-US" dirty="0"/>
               <a:t>FGM magnetic field </a:t>
             </a:r>
           </a:p>
           <a:p>
             <a:pPr lvl="1"/>
             <a:r>
-              <a:rPr lang="en-US" dirty="0" smtClean="0"/>
+              <a:rPr lang="en-US" dirty="0"/>
               <a:t>Error sources</a:t>
             </a:r>
           </a:p>
           <a:p>
             <a:pPr lvl="2"/>
             <a:r>
-              <a:rPr lang="en-US" dirty="0" smtClean="0"/>
+              <a:rPr lang="en-US" dirty="0"/>
               <a:t>Spacecraft Potential</a:t>
             </a:r>
           </a:p>
           <a:p>
             <a:pPr lvl="2"/>
             <a:r>
-              <a:rPr lang="en-US" dirty="0" smtClean="0"/>
+              <a:rPr lang="en-US" dirty="0"/>
               <a:t>Internally-generated photoelectrons</a:t>
             </a:r>
           </a:p>
           <a:p>
             <a:pPr lvl="2"/>
             <a:r>
-              <a:rPr lang="en-US" dirty="0" smtClean="0"/>
+              <a:rPr lang="en-US" dirty="0"/>
               <a:t>FGM errors</a:t>
             </a:r>
           </a:p>
           <a:p>
             <a:r>
-              <a:rPr lang="en-US" dirty="0" smtClean="0">
+              <a:rPr lang="en-US" dirty="0">
                 <a:solidFill>
                   <a:schemeClr val="tx2">
                     <a:lumMod val="60000"/>
@@ -5206,48 +5188,48 @@
           <a:p>
             <a:pPr lvl="1"/>
             <a:r>
-              <a:rPr lang="en-US" dirty="0" smtClean="0"/>
+              <a:rPr lang="en-US" dirty="0"/>
               <a:t>Closed field lines</a:t>
             </a:r>
           </a:p>
           <a:p>
             <a:pPr lvl="2"/>
             <a:r>
-              <a:rPr lang="en-US" dirty="0" smtClean="0"/>
+              <a:rPr lang="en-US" dirty="0"/>
               <a:t>Environmental/Solar Wind Conditions</a:t>
             </a:r>
           </a:p>
           <a:p>
             <a:pPr lvl="2"/>
             <a:r>
-              <a:rPr lang="en-US" dirty="0" smtClean="0"/>
+              <a:rPr lang="en-US" dirty="0"/>
               <a:t>Expect counter-streaming flux</a:t>
             </a:r>
           </a:p>
           <a:p>
             <a:pPr lvl="1"/>
             <a:r>
-              <a:rPr lang="en-US" dirty="0" smtClean="0"/>
+              <a:rPr lang="en-US" dirty="0"/>
               <a:t>Pitch angle distribution plots</a:t>
             </a:r>
           </a:p>
           <a:p>
             <a:pPr lvl="1"/>
             <a:r>
-              <a:rPr lang="en-US" dirty="0" smtClean="0"/>
+              <a:rPr lang="en-US" dirty="0"/>
               <a:t>Differential particle flux</a:t>
             </a:r>
           </a:p>
           <a:p>
             <a:pPr lvl="1"/>
             <a:r>
-              <a:rPr lang="en-US" dirty="0" smtClean="0"/>
+              <a:rPr lang="en-US" dirty="0"/>
               <a:t>Flux asymmetry, northward versus southward</a:t>
             </a:r>
           </a:p>
           <a:p>
             <a:r>
-              <a:rPr lang="en-US" dirty="0" smtClean="0">
+              <a:rPr lang="en-US" dirty="0">
                 <a:solidFill>
                   <a:srgbClr val="00B050"/>
                 </a:solidFill>
@@ -5258,10 +5240,9 @@
           <a:p>
             <a:pPr lvl="1"/>
             <a:r>
-              <a:rPr lang="en-US" dirty="0" smtClean="0"/>
+              <a:rPr lang="en-US" dirty="0"/>
               <a:t>Wave-particle interactions</a:t>
             </a:r>
-            <a:endParaRPr lang="en-US" dirty="0"/>
           </a:p>
         </p:txBody>
       </p:sp>
@@ -5418,10 +5399,9 @@
           <a:p>
             <a:pPr algn="ctr"/>
             <a:r>
-              <a:rPr lang="en-US" dirty="0" smtClean="0"/>
+              <a:rPr lang="en-US" dirty="0"/>
               <a:t>Science Context</a:t>
             </a:r>
-            <a:endParaRPr lang="en-US" dirty="0"/>
           </a:p>
         </p:txBody>
       </p:sp>
@@ -5460,10 +5440,9 @@
           <a:p>
             <a:pPr algn="ctr"/>
             <a:r>
-              <a:rPr lang="en-US" dirty="0" smtClean="0"/>
+              <a:rPr lang="en-US" dirty="0"/>
               <a:t>Instrument Measurement</a:t>
             </a:r>
-            <a:endParaRPr lang="en-US" dirty="0"/>
           </a:p>
         </p:txBody>
       </p:sp>
@@ -5504,10 +5483,9 @@
           <a:p>
             <a:pPr algn="ctr"/>
             <a:r>
-              <a:rPr lang="en-US" dirty="0" smtClean="0"/>
+              <a:rPr lang="en-US" dirty="0"/>
               <a:t>Aug 04</a:t>
             </a:r>
-            <a:endParaRPr lang="en-US" dirty="0"/>
           </a:p>
         </p:txBody>
       </p:sp>
@@ -5548,10 +5526,9 @@
           <a:p>
             <a:pPr algn="ctr"/>
             <a:r>
-              <a:rPr lang="en-US" dirty="0" smtClean="0"/>
+              <a:rPr lang="en-US" dirty="0"/>
               <a:t>Oct 26</a:t>
             </a:r>
-            <a:endParaRPr lang="en-US" dirty="0"/>
           </a:p>
         </p:txBody>
       </p:sp>
@@ -5592,10 +5569,9 @@
           <a:p>
             <a:pPr algn="ctr"/>
             <a:r>
-              <a:rPr lang="en-US" dirty="0" smtClean="0"/>
+              <a:rPr lang="en-US" dirty="0"/>
               <a:t>Mar 02</a:t>
             </a:r>
-            <a:endParaRPr lang="en-US" dirty="0"/>
           </a:p>
         </p:txBody>
       </p:sp>
@@ -5634,10 +5610,9 @@
           <a:p>
             <a:pPr algn="ctr"/>
             <a:r>
-              <a:rPr lang="en-US" dirty="0" smtClean="0"/>
+              <a:rPr lang="en-US" dirty="0"/>
               <a:t>Title &amp; Authors</a:t>
             </a:r>
-            <a:endParaRPr lang="en-US" dirty="0"/>
           </a:p>
         </p:txBody>
       </p:sp>
@@ -5678,10 +5653,9 @@
           <a:p>
             <a:pPr algn="ctr"/>
             <a:r>
-              <a:rPr lang="en-US" dirty="0" smtClean="0"/>
+              <a:rPr lang="en-US" dirty="0"/>
               <a:t>Open Questions &amp; Future Work</a:t>
             </a:r>
-            <a:endParaRPr lang="en-US" dirty="0"/>
           </a:p>
         </p:txBody>
       </p:sp>
@@ -5731,10 +5705,9 @@
           <a:lstStyle/>
           <a:p>
             <a:r>
-              <a:rPr lang="en-US" dirty="0" smtClean="0"/>
+              <a:rPr lang="en-US" dirty="0"/>
               <a:t>Aug 04 - 2015</a:t>
             </a:r>
-            <a:endParaRPr lang="en-US" dirty="0"/>
           </a:p>
         </p:txBody>
       </p:sp>
@@ -5786,13 +5759,6 @@
   <p:clrMapOvr>
     <a:masterClrMapping/>
   </p:clrMapOvr>
-  <p:timing>
-    <p:tnLst>
-      <p:par>
-        <p:cTn id="1" dur="indefinite" restart="never" nodeType="tmRoot"/>
-      </p:par>
-    </p:tnLst>
-  </p:timing>
 </p:sld>
 </file>
 
@@ -5836,10 +5802,9 @@
           <a:lstStyle/>
           <a:p>
             <a:r>
-              <a:rPr lang="en-US" dirty="0" smtClean="0"/>
+              <a:rPr lang="en-US" dirty="0"/>
               <a:t>Context</a:t>
             </a:r>
-            <a:endParaRPr lang="en-US" dirty="0"/>
           </a:p>
         </p:txBody>
       </p:sp>
@@ -5971,13 +5936,6 @@
   <p:clrMapOvr>
     <a:masterClrMapping/>
   </p:clrMapOvr>
-  <p:timing>
-    <p:tnLst>
-      <p:par>
-        <p:cTn id="1" dur="indefinite" restart="never" nodeType="tmRoot"/>
-      </p:par>
-    </p:tnLst>
-  </p:timing>
 </p:sld>
 </file>
 
@@ -6021,10 +5979,9 @@
           <a:lstStyle/>
           <a:p>
             <a:r>
-              <a:rPr lang="en-US" dirty="0" smtClean="0"/>
+              <a:rPr lang="en-US" dirty="0"/>
               <a:t>Pitch Angle Distributions</a:t>
             </a:r>
-            <a:endParaRPr lang="en-US" dirty="0"/>
           </a:p>
         </p:txBody>
       </p:sp>
@@ -6167,18 +6124,41 @@
           </a:prstGeom>
         </p:spPr>
       </p:pic>
+      <p:pic>
+        <p:nvPicPr>
+          <p:cNvPr id="7" name="Picture 6"/>
+          <p:cNvPicPr>
+            <a:picLocks noChangeAspect="1"/>
+          </p:cNvPicPr>
+          <p:nvPr/>
+        </p:nvPicPr>
+        <p:blipFill>
+          <a:blip r:embed="rId6" cstate="print">
+            <a:extLst>
+              <a:ext uri="{28A0092B-C50C-407E-A947-70E740481C1C}">
+                <a14:useLocalDpi xmlns:a14="http://schemas.microsoft.com/office/drawing/2010/main" val="0"/>
+              </a:ext>
+            </a:extLst>
+          </a:blip>
+          <a:stretch>
+            <a:fillRect/>
+          </a:stretch>
+        </p:blipFill>
+        <p:spPr>
+          <a:xfrm>
+            <a:off x="-3240188" y="1600200"/>
+            <a:ext cx="3505200" cy="3943350"/>
+          </a:xfrm>
+          <a:prstGeom prst="rect">
+            <a:avLst/>
+          </a:prstGeom>
+        </p:spPr>
+      </p:pic>
     </p:spTree>
   </p:cSld>
   <p:clrMapOvr>
     <a:masterClrMapping/>
   </p:clrMapOvr>
-  <p:timing>
-    <p:tnLst>
-      <p:par>
-        <p:cTn id="1" dur="indefinite" restart="never" nodeType="tmRoot"/>
-      </p:par>
-    </p:tnLst>
-  </p:timing>
 </p:sld>
 </file>
 
@@ -6284,8 +6264,8 @@
           </a:prstGeom>
         </p:spPr>
       </p:pic>
-      <mc:AlternateContent xmlns:mc="http://schemas.openxmlformats.org/markup-compatibility/2006">
-        <mc:Choice xmlns:a14="http://schemas.microsoft.com/office/drawing/2010/main" Requires="a14">
+      <mc:AlternateContent xmlns:mc="http://schemas.openxmlformats.org/markup-compatibility/2006" xmlns:a14="http://schemas.microsoft.com/office/drawing/2010/main">
+        <mc:Choice Requires="a14">
           <p:sp>
             <p:nvSpPr>
               <p:cNvPr id="8" name="TextBox 7"/>
@@ -6309,7 +6289,7 @@
               <a:lstStyle/>
               <a:p>
                 <a:r>
-                  <a:rPr lang="en-US" dirty="0" smtClean="0"/>
+                  <a:rPr lang="en-US" dirty="0"/>
                   <a:t>Northward Magnetic Field means </a:t>
                 </a:r>
                 <a14:m>
@@ -6335,7 +6315,7 @@
                   </m:oMath>
                 </a14:m>
                 <a:r>
-                  <a:rPr lang="en-US" dirty="0" smtClean="0"/>
+                  <a:rPr lang="en-US" dirty="0"/>
                   <a:t> comes from southern hemisphere (Northward flux) and </a:t>
                 </a:r>
                 <a14:m>
@@ -6361,15 +6341,14 @@
                   </m:oMath>
                 </a14:m>
                 <a:r>
-                  <a:rPr lang="en-US" dirty="0" smtClean="0"/>
+                  <a:rPr lang="en-US" dirty="0"/>
                   <a:t> comes from northern hemisphere (Southward flux)</a:t>
                 </a:r>
-                <a:endParaRPr lang="en-US" dirty="0"/>
               </a:p>
             </p:txBody>
           </p:sp>
         </mc:Choice>
-        <mc:Fallback>
+        <mc:Fallback xmlns="">
           <p:sp>
             <p:nvSpPr>
               <p:cNvPr id="8" name="TextBox 7"/>
@@ -6454,10 +6433,9 @@
           <a:lstStyle/>
           <a:p>
             <a:r>
-              <a:rPr lang="en-US" dirty="0" smtClean="0"/>
+              <a:rPr lang="en-US" dirty="0"/>
               <a:t>Oct 26 - 2015</a:t>
             </a:r>
-            <a:endParaRPr lang="en-US" dirty="0"/>
           </a:p>
         </p:txBody>
       </p:sp>
@@ -6509,13 +6487,6 @@
   <p:clrMapOvr>
     <a:masterClrMapping/>
   </p:clrMapOvr>
-  <p:timing>
-    <p:tnLst>
-      <p:par>
-        <p:cTn id="1" dur="indefinite" restart="never" nodeType="tmRoot"/>
-      </p:par>
-    </p:tnLst>
-  </p:timing>
 </p:sld>
 </file>
 

</xml_diff>